<commit_message>
DDDPacemaker revision 2. All modes working
</commit_message>
<xml_diff>
--- a/DDD Pacemaker.pptx
+++ b/DDD Pacemaker.pptx
@@ -5,31 +5,32 @@
     <p:sldMasterId id="2147483659" r:id="rId1"/>
   </p:sldMasterIdLst>
   <p:notesMasterIdLst>
-    <p:notesMasterId r:id="rId7"/>
+    <p:notesMasterId r:id="rId8"/>
   </p:notesMasterIdLst>
   <p:sldIdLst>
     <p:sldId id="256" r:id="rId2"/>
     <p:sldId id="257" r:id="rId3"/>
     <p:sldId id="258" r:id="rId4"/>
-    <p:sldId id="259" r:id="rId5"/>
-    <p:sldId id="260" r:id="rId6"/>
+    <p:sldId id="261" r:id="rId5"/>
+    <p:sldId id="259" r:id="rId6"/>
+    <p:sldId id="260" r:id="rId7"/>
   </p:sldIdLst>
   <p:sldSz cx="9144000" cy="5143500" type="screen16x9"/>
   <p:notesSz cx="6858000" cy="9144000"/>
   <p:embeddedFontLst>
     <p:embeddedFont>
       <p:font typeface="Calibri" panose="020F0502020204030204" pitchFamily="34" charset="0"/>
-      <p:regular r:id="rId8"/>
-      <p:bold r:id="rId9"/>
-      <p:italic r:id="rId10"/>
-      <p:boldItalic r:id="rId11"/>
+      <p:regular r:id="rId9"/>
+      <p:bold r:id="rId10"/>
+      <p:italic r:id="rId11"/>
+      <p:boldItalic r:id="rId12"/>
     </p:embeddedFont>
     <p:embeddedFont>
       <p:font typeface="Nunito" panose="020B0604020202020204" charset="0"/>
-      <p:regular r:id="rId12"/>
-      <p:bold r:id="rId13"/>
-      <p:italic r:id="rId14"/>
-      <p:boldItalic r:id="rId15"/>
+      <p:regular r:id="rId13"/>
+      <p:bold r:id="rId14"/>
+      <p:italic r:id="rId15"/>
+      <p:boldItalic r:id="rId16"/>
     </p:embeddedFont>
   </p:embeddedFontLst>
   <p:defaultTextStyle>
@@ -9590,10 +9591,10 @@
       </p:sp>
       <p:pic>
         <p:nvPicPr>
-          <p:cNvPr id="5" name="Picture 4">
+          <p:cNvPr id="3" name="Picture 2">
             <a:extLst>
               <a:ext uri="{FF2B5EF4-FFF2-40B4-BE49-F238E27FC236}">
-                <a16:creationId xmlns:a16="http://schemas.microsoft.com/office/drawing/2014/main" id="{4EA5D1CC-4358-41AE-9543-0B6172956C96}"/>
+                <a16:creationId xmlns:a16="http://schemas.microsoft.com/office/drawing/2014/main" id="{26F55218-EDC9-4583-85E6-300DF0CB90E9}"/>
               </a:ext>
             </a:extLst>
           </p:cNvPr>
@@ -9610,8 +9611,8 @@
         </p:blipFill>
         <p:spPr>
           <a:xfrm>
-            <a:off x="2044570" y="282917"/>
-            <a:ext cx="5054860" cy="4591286"/>
+            <a:off x="2546821" y="425611"/>
+            <a:ext cx="4660803" cy="4292278"/>
           </a:xfrm>
           <a:prstGeom prst="rect">
             <a:avLst/>
@@ -9627,6 +9628,168 @@
 </file>
 
 <file path=ppt/slides/slide4.xml><?xml version="1.0" encoding="utf-8"?>
+<p:sld xmlns:a="http://schemas.openxmlformats.org/drawingml/2006/main" xmlns:r="http://schemas.openxmlformats.org/officeDocument/2006/relationships" xmlns:p="http://schemas.openxmlformats.org/presentationml/2006/main">
+  <p:cSld>
+    <p:spTree>
+      <p:nvGrpSpPr>
+        <p:cNvPr id="1" name=""/>
+        <p:cNvGrpSpPr/>
+        <p:nvPr/>
+      </p:nvGrpSpPr>
+      <p:grpSpPr>
+        <a:xfrm>
+          <a:off x="0" y="0"/>
+          <a:ext cx="0" cy="0"/>
+          <a:chOff x="0" y="0"/>
+          <a:chExt cx="0" cy="0"/>
+        </a:xfrm>
+      </p:grpSpPr>
+      <p:sp>
+        <p:nvSpPr>
+          <p:cNvPr id="2" name="Title 1">
+            <a:extLst>
+              <a:ext uri="{FF2B5EF4-FFF2-40B4-BE49-F238E27FC236}">
+                <a16:creationId xmlns:a16="http://schemas.microsoft.com/office/drawing/2014/main" id="{EF7A041D-AD60-4349-AEE6-C5A22C0F6C65}"/>
+              </a:ext>
+            </a:extLst>
+          </p:cNvPr>
+          <p:cNvSpPr>
+            <a:spLocks noGrp="1"/>
+          </p:cNvSpPr>
+          <p:nvPr>
+            <p:ph type="title"/>
+          </p:nvPr>
+        </p:nvSpPr>
+        <p:spPr>
+          <a:xfrm>
+            <a:off x="819150" y="323086"/>
+            <a:ext cx="7505700" cy="555774"/>
+          </a:xfrm>
+        </p:spPr>
+        <p:txBody>
+          <a:bodyPr/>
+          <a:lstStyle/>
+          <a:p>
+            <a:r>
+              <a:rPr lang="en-IN" dirty="0"/>
+              <a:t>Timers and interface</a:t>
+            </a:r>
+          </a:p>
+        </p:txBody>
+      </p:sp>
+      <p:pic>
+        <p:nvPicPr>
+          <p:cNvPr id="6" name="Picture 5">
+            <a:extLst>
+              <a:ext uri="{FF2B5EF4-FFF2-40B4-BE49-F238E27FC236}">
+                <a16:creationId xmlns:a16="http://schemas.microsoft.com/office/drawing/2014/main" id="{591F0687-A14D-4DB8-A44A-739C08E0DC06}"/>
+              </a:ext>
+            </a:extLst>
+          </p:cNvPr>
+          <p:cNvPicPr>
+            <a:picLocks noChangeAspect="1"/>
+          </p:cNvPicPr>
+          <p:nvPr/>
+        </p:nvPicPr>
+        <p:blipFill>
+          <a:blip r:embed="rId2"/>
+          <a:stretch>
+            <a:fillRect/>
+          </a:stretch>
+        </p:blipFill>
+        <p:spPr>
+          <a:xfrm>
+            <a:off x="926912" y="2012959"/>
+            <a:ext cx="5358627" cy="1168238"/>
+          </a:xfrm>
+          <a:prstGeom prst="rect">
+            <a:avLst/>
+          </a:prstGeom>
+        </p:spPr>
+      </p:pic>
+      <p:pic>
+        <p:nvPicPr>
+          <p:cNvPr id="8" name="Picture 7">
+            <a:extLst>
+              <a:ext uri="{FF2B5EF4-FFF2-40B4-BE49-F238E27FC236}">
+                <a16:creationId xmlns:a16="http://schemas.microsoft.com/office/drawing/2014/main" id="{5B17C3FE-5BED-4339-9912-D72AFBADD181}"/>
+              </a:ext>
+            </a:extLst>
+          </p:cNvPr>
+          <p:cNvPicPr>
+            <a:picLocks noChangeAspect="1"/>
+          </p:cNvPicPr>
+          <p:nvPr/>
+        </p:nvPicPr>
+        <p:blipFill>
+          <a:blip r:embed="rId3"/>
+          <a:stretch>
+            <a:fillRect/>
+          </a:stretch>
+        </p:blipFill>
+        <p:spPr>
+          <a:xfrm>
+            <a:off x="926912" y="920987"/>
+            <a:ext cx="7290175" cy="938549"/>
+          </a:xfrm>
+          <a:prstGeom prst="rect">
+            <a:avLst/>
+          </a:prstGeom>
+        </p:spPr>
+      </p:pic>
+      <p:sp>
+        <p:nvSpPr>
+          <p:cNvPr id="9" name="TextBox 8">
+            <a:extLst>
+              <a:ext uri="{FF2B5EF4-FFF2-40B4-BE49-F238E27FC236}">
+                <a16:creationId xmlns:a16="http://schemas.microsoft.com/office/drawing/2014/main" id="{C61DFFF0-CEA5-44C7-BBF7-536B1798E194}"/>
+              </a:ext>
+            </a:extLst>
+          </p:cNvPr>
+          <p:cNvSpPr txBox="1"/>
+          <p:nvPr/>
+        </p:nvSpPr>
+        <p:spPr>
+          <a:xfrm>
+            <a:off x="873030" y="3436219"/>
+            <a:ext cx="7397938" cy="307777"/>
+          </a:xfrm>
+          <a:prstGeom prst="rect">
+            <a:avLst/>
+          </a:prstGeom>
+          <a:noFill/>
+        </p:spPr>
+        <p:txBody>
+          <a:bodyPr wrap="square" rtlCol="0">
+            <a:spAutoFit/>
+          </a:bodyPr>
+          <a:lstStyle/>
+          <a:p>
+            <a:pPr marL="285750" indent="-285750">
+              <a:buFont typeface="Wingdings" panose="05000000000000000000" pitchFamily="2" charset="2"/>
+              <a:buChar char="§"/>
+            </a:pPr>
+            <a:r>
+              <a:rPr lang="en-IN" dirty="0"/>
+              <a:t>The input and output signals to control timer peripherals with each tick()</a:t>
+            </a:r>
+          </a:p>
+        </p:txBody>
+      </p:sp>
+    </p:spTree>
+    <p:extLst>
+      <p:ext uri="{BB962C8B-B14F-4D97-AF65-F5344CB8AC3E}">
+        <p14:creationId xmlns:p14="http://schemas.microsoft.com/office/powerpoint/2010/main" val="752139000"/>
+      </p:ext>
+    </p:extLst>
+  </p:cSld>
+  <p:clrMapOvr>
+    <a:masterClrMapping/>
+  </p:clrMapOvr>
+</p:sld>
+</file>
+
+<file path=ppt/slides/slide5.xml><?xml version="1.0" encoding="utf-8"?>
 <p:sld xmlns:a="http://schemas.openxmlformats.org/drawingml/2006/main" xmlns:r="http://schemas.openxmlformats.org/officeDocument/2006/relationships" xmlns:p="http://schemas.openxmlformats.org/presentationml/2006/main">
   <p:cSld>
     <p:spTree>
@@ -9868,7 +10031,7 @@
 </p:sld>
 </file>
 
-<file path=ppt/slides/slide5.xml><?xml version="1.0" encoding="utf-8"?>
+<file path=ppt/slides/slide6.xml><?xml version="1.0" encoding="utf-8"?>
 <p:sld xmlns:a="http://schemas.openxmlformats.org/drawingml/2006/main" xmlns:r="http://schemas.openxmlformats.org/officeDocument/2006/relationships" xmlns:p="http://schemas.openxmlformats.org/presentationml/2006/main">
   <p:cSld>
     <p:spTree>

</xml_diff>

<commit_message>
Demo rev1. Readme completed. Scchart file name changed for demo PPT done
</commit_message>
<xml_diff>
--- a/DDD Pacemaker.pptx
+++ b/DDD Pacemaker.pptx
@@ -9450,7 +9450,11 @@
             </a:pPr>
             <a:r>
               <a:rPr lang="en-GB" sz="1800" dirty="0"/>
-              <a:t>Our idea was to make FSMs according to heart or pace events. </a:t>
+              <a:t>Our idea was to make FSMs to monitor/control </a:t>
+            </a:r>
+            <a:r>
+              <a:rPr lang="en-GB" sz="1800"/>
+              <a:t>Heart Events.</a:t>
             </a:r>
             <a:endParaRPr sz="1800" dirty="0"/>
           </a:p>
@@ -9485,6 +9489,42 @@
             <a:r>
               <a:rPr lang="en-GB" sz="1800" dirty="0"/>
               <a:t>Our desired outcome was met which was to achieve all functionality with the least amount of complexity possible.</a:t>
+            </a:r>
+          </a:p>
+          <a:p>
+            <a:pPr marL="285750" lvl="0" indent="-285750" algn="l" rtl="0">
+              <a:spcBef>
+                <a:spcPts val="1600"/>
+              </a:spcBef>
+              <a:spcAft>
+                <a:spcPts val="0"/>
+              </a:spcAft>
+              <a:buFont typeface="Wingdings" panose="05000000000000000000" pitchFamily="2" charset="2"/>
+              <a:buChar char="§"/>
+            </a:pPr>
+            <a:r>
+              <a:rPr lang="en-GB" sz="1800" dirty="0" err="1"/>
+              <a:t>paceMaker.C</a:t>
+            </a:r>
+            <a:r>
+              <a:rPr lang="en-GB" sz="1800" dirty="0"/>
+              <a:t> contains the logic to handle events from </a:t>
+            </a:r>
+            <a:r>
+              <a:rPr lang="en-GB" sz="1800" dirty="0" err="1"/>
+              <a:t>pacemakerFSM.c</a:t>
+            </a:r>
+            <a:r>
+              <a:rPr lang="en-GB" sz="1800" dirty="0"/>
+              <a:t> (which is the compiled </a:t>
+            </a:r>
+            <a:r>
+              <a:rPr lang="en-GB" sz="1800" dirty="0" err="1"/>
+              <a:t>ScCharts</a:t>
+            </a:r>
+            <a:r>
+              <a:rPr lang="en-GB" sz="1800" dirty="0"/>
+              <a:t> program), as well as controlling functionality based on mode. </a:t>
             </a:r>
             <a:endParaRPr sz="1800" dirty="0"/>
           </a:p>
@@ -9591,10 +9631,10 @@
       </p:sp>
       <p:pic>
         <p:nvPicPr>
-          <p:cNvPr id="3" name="Picture 2">
+          <p:cNvPr id="4" name="Picture 3">
             <a:extLst>
               <a:ext uri="{FF2B5EF4-FFF2-40B4-BE49-F238E27FC236}">
-                <a16:creationId xmlns:a16="http://schemas.microsoft.com/office/drawing/2014/main" id="{26F55218-EDC9-4583-85E6-300DF0CB90E9}"/>
+                <a16:creationId xmlns:a16="http://schemas.microsoft.com/office/drawing/2014/main" id="{3F74B165-05F0-4276-8CD0-2EEF018B1E7B}"/>
               </a:ext>
             </a:extLst>
           </p:cNvPr>
@@ -9611,8 +9651,8 @@
         </p:blipFill>
         <p:spPr>
           <a:xfrm>
-            <a:off x="2546821" y="425611"/>
-            <a:ext cx="4660803" cy="4292278"/>
+            <a:off x="2413525" y="284111"/>
+            <a:ext cx="5056606" cy="4575278"/>
           </a:xfrm>
           <a:prstGeom prst="rect">
             <a:avLst/>
@@ -9672,7 +9712,7 @@
           <a:p>
             <a:r>
               <a:rPr lang="en-IN" dirty="0"/>
-              <a:t>Timers and interface</a:t>
+              <a:t>Timers and interface(handling events)</a:t>
             </a:r>
           </a:p>
         </p:txBody>
@@ -9699,38 +9739,8 @@
         </p:blipFill>
         <p:spPr>
           <a:xfrm>
-            <a:off x="926912" y="2012959"/>
+            <a:off x="873030" y="1987631"/>
             <a:ext cx="5358627" cy="1168238"/>
-          </a:xfrm>
-          <a:prstGeom prst="rect">
-            <a:avLst/>
-          </a:prstGeom>
-        </p:spPr>
-      </p:pic>
-      <p:pic>
-        <p:nvPicPr>
-          <p:cNvPr id="8" name="Picture 7">
-            <a:extLst>
-              <a:ext uri="{FF2B5EF4-FFF2-40B4-BE49-F238E27FC236}">
-                <a16:creationId xmlns:a16="http://schemas.microsoft.com/office/drawing/2014/main" id="{5B17C3FE-5BED-4339-9912-D72AFBADD181}"/>
-              </a:ext>
-            </a:extLst>
-          </p:cNvPr>
-          <p:cNvPicPr>
-            <a:picLocks noChangeAspect="1"/>
-          </p:cNvPicPr>
-          <p:nvPr/>
-        </p:nvPicPr>
-        <p:blipFill>
-          <a:blip r:embed="rId3"/>
-          <a:stretch>
-            <a:fillRect/>
-          </a:stretch>
-        </p:blipFill>
-        <p:spPr>
-          <a:xfrm>
-            <a:off x="926912" y="920987"/>
-            <a:ext cx="7290175" cy="938549"/>
           </a:xfrm>
           <a:prstGeom prst="rect">
             <a:avLst/>
@@ -9751,8 +9761,8 @@
         </p:nvSpPr>
         <p:spPr>
           <a:xfrm>
-            <a:off x="873030" y="3436219"/>
-            <a:ext cx="7397938" cy="307777"/>
+            <a:off x="819150" y="3505790"/>
+            <a:ext cx="7397938" cy="523220"/>
           </a:xfrm>
           <a:prstGeom prst="rect">
             <a:avLst/>
@@ -9771,11 +9781,89 @@
             </a:pPr>
             <a:r>
               <a:rPr lang="en-IN" dirty="0"/>
-              <a:t>The input and output signals to control timer peripherals with each tick()</a:t>
+              <a:t>The input and output signals to control timer peripherals.</a:t>
+            </a:r>
+          </a:p>
+          <a:p>
+            <a:pPr marL="285750" indent="-285750">
+              <a:buFont typeface="Wingdings" panose="05000000000000000000" pitchFamily="2" charset="2"/>
+              <a:buChar char="§"/>
+            </a:pPr>
+            <a:r>
+              <a:rPr lang="en-IN" dirty="0"/>
+              <a:t>There are functions in </a:t>
+            </a:r>
+            <a:r>
+              <a:rPr lang="en-IN" dirty="0" err="1"/>
+              <a:t>pacemaker.C</a:t>
+            </a:r>
+            <a:r>
+              <a:rPr lang="en-IN" dirty="0"/>
+              <a:t> program to handle all heart events with each tick(). </a:t>
             </a:r>
           </a:p>
         </p:txBody>
       </p:sp>
+      <p:pic>
+        <p:nvPicPr>
+          <p:cNvPr id="4" name="Picture 3">
+            <a:extLst>
+              <a:ext uri="{FF2B5EF4-FFF2-40B4-BE49-F238E27FC236}">
+                <a16:creationId xmlns:a16="http://schemas.microsoft.com/office/drawing/2014/main" id="{D7A1567A-E2F1-48A4-8EE2-4F74D9407C67}"/>
+              </a:ext>
+            </a:extLst>
+          </p:cNvPr>
+          <p:cNvPicPr>
+            <a:picLocks noChangeAspect="1"/>
+          </p:cNvPicPr>
+          <p:nvPr/>
+        </p:nvPicPr>
+        <p:blipFill>
+          <a:blip r:embed="rId3"/>
+          <a:stretch>
+            <a:fillRect/>
+          </a:stretch>
+        </p:blipFill>
+        <p:spPr>
+          <a:xfrm>
+            <a:off x="873030" y="1091657"/>
+            <a:ext cx="7652143" cy="793791"/>
+          </a:xfrm>
+          <a:prstGeom prst="rect">
+            <a:avLst/>
+          </a:prstGeom>
+        </p:spPr>
+      </p:pic>
+      <p:pic>
+        <p:nvPicPr>
+          <p:cNvPr id="7" name="Picture 6">
+            <a:extLst>
+              <a:ext uri="{FF2B5EF4-FFF2-40B4-BE49-F238E27FC236}">
+                <a16:creationId xmlns:a16="http://schemas.microsoft.com/office/drawing/2014/main" id="{E63255A5-1BAE-4CA8-BB11-7C901C8F2B6E}"/>
+              </a:ext>
+            </a:extLst>
+          </p:cNvPr>
+          <p:cNvPicPr>
+            <a:picLocks noChangeAspect="1"/>
+          </p:cNvPicPr>
+          <p:nvPr/>
+        </p:nvPicPr>
+        <p:blipFill>
+          <a:blip r:embed="rId4"/>
+          <a:stretch>
+            <a:fillRect/>
+          </a:stretch>
+        </p:blipFill>
+        <p:spPr>
+          <a:xfrm>
+            <a:off x="6390151" y="2012959"/>
+            <a:ext cx="2203563" cy="1365320"/>
+          </a:xfrm>
+          <a:prstGeom prst="rect">
+            <a:avLst/>
+          </a:prstGeom>
+        </p:spPr>
+      </p:pic>
     </p:spTree>
     <p:extLst>
       <p:ext uri="{BB962C8B-B14F-4D97-AF65-F5344CB8AC3E}">

</xml_diff>

<commit_message>
Added strong abort for VPace_FSM init state
</commit_message>
<xml_diff>
--- a/DDD Pacemaker.pptx
+++ b/DDD Pacemaker.pptx
@@ -9450,11 +9450,7 @@
             </a:pPr>
             <a:r>
               <a:rPr lang="en-GB" sz="1800" dirty="0"/>
-              <a:t>Our idea was to make FSMs to monitor/control </a:t>
-            </a:r>
-            <a:r>
-              <a:rPr lang="en-GB" sz="1800"/>
-              <a:t>Heart Events.</a:t>
+              <a:t>Our idea was to make FSMs to monitor/control Heart Events.</a:t>
             </a:r>
             <a:endParaRPr sz="1800" dirty="0"/>
           </a:p>
@@ -10073,15 +10069,7 @@
             </a:pPr>
             <a:r>
               <a:rPr lang="en-GB" sz="1800" dirty="0"/>
-              <a:t>Mode 2: Non-blocking UART is used to interface the virtual heart program with the </a:t>
-            </a:r>
-            <a:r>
-              <a:rPr lang="en-GB" sz="1800" dirty="0" err="1"/>
-              <a:t>pacemaker.It</a:t>
-            </a:r>
-            <a:r>
-              <a:rPr lang="en-GB" sz="1800" dirty="0"/>
-              <a:t> paces the heart according to diseases selected.</a:t>
+              <a:t>Mode 2: Non-blocking UART is used to interface the virtual heart program with the pacemaker. It paces the heart according to diseases selected.</a:t>
             </a:r>
             <a:endParaRPr sz="1800" dirty="0"/>
           </a:p>

</xml_diff>

<commit_message>
Updated ppt picture for control unit`
</commit_message>
<xml_diff>
--- a/DDD Pacemaker.pptx
+++ b/DDD Pacemaker.pptx
@@ -9627,10 +9627,10 @@
       </p:sp>
       <p:pic>
         <p:nvPicPr>
-          <p:cNvPr id="4" name="Picture 3">
+          <p:cNvPr id="6" name="Picture 5">
             <a:extLst>
               <a:ext uri="{FF2B5EF4-FFF2-40B4-BE49-F238E27FC236}">
-                <a16:creationId xmlns:a16="http://schemas.microsoft.com/office/drawing/2014/main" id="{3F74B165-05F0-4276-8CD0-2EEF018B1E7B}"/>
+                <a16:creationId xmlns:a16="http://schemas.microsoft.com/office/drawing/2014/main" id="{2C89849B-9DC5-410A-9CE3-6BFA3FF2A005}"/>
               </a:ext>
             </a:extLst>
           </p:cNvPr>
@@ -9647,8 +9647,8 @@
         </p:blipFill>
         <p:spPr>
           <a:xfrm>
-            <a:off x="2413525" y="284111"/>
-            <a:ext cx="5056606" cy="4575278"/>
+            <a:off x="2548981" y="313944"/>
+            <a:ext cx="4950636" cy="4446596"/>
           </a:xfrm>
           <a:prstGeom prst="rect">
             <a:avLst/>

</xml_diff>